<commit_message>
Results update for revision
</commit_message>
<xml_diff>
--- a/Results for journal comparison 1/OxfordCell1-MLP-Discharging-WS20-0.0001/2/Figure.pptx
+++ b/Results for journal comparison 1/OxfordCell1-MLP-Discharging-WS20-0.0001/2/Figure.pptx
@@ -260,7 +260,7 @@
           <a:p>
             <a:fld id="{D373245B-AA3F-41B9-BB91-29FEC5856266}" type="datetimeFigureOut">
               <a:rPr lang="en-US" smtClean="0"/>
-              <a:t>5/13/2025</a:t>
+              <a:t>6/11/2025</a:t>
             </a:fld>
             <a:endParaRPr lang="en-US"/>
           </a:p>
@@ -458,7 +458,7 @@
           <a:p>
             <a:fld id="{D373245B-AA3F-41B9-BB91-29FEC5856266}" type="datetimeFigureOut">
               <a:rPr lang="en-US" smtClean="0"/>
-              <a:t>5/13/2025</a:t>
+              <a:t>6/11/2025</a:t>
             </a:fld>
             <a:endParaRPr lang="en-US"/>
           </a:p>
@@ -666,7 +666,7 @@
           <a:p>
             <a:fld id="{D373245B-AA3F-41B9-BB91-29FEC5856266}" type="datetimeFigureOut">
               <a:rPr lang="en-US" smtClean="0"/>
-              <a:t>5/13/2025</a:t>
+              <a:t>6/11/2025</a:t>
             </a:fld>
             <a:endParaRPr lang="en-US"/>
           </a:p>
@@ -864,7 +864,7 @@
           <a:p>
             <a:fld id="{D373245B-AA3F-41B9-BB91-29FEC5856266}" type="datetimeFigureOut">
               <a:rPr lang="en-US" smtClean="0"/>
-              <a:t>5/13/2025</a:t>
+              <a:t>6/11/2025</a:t>
             </a:fld>
             <a:endParaRPr lang="en-US"/>
           </a:p>
@@ -1139,7 +1139,7 @@
           <a:p>
             <a:fld id="{D373245B-AA3F-41B9-BB91-29FEC5856266}" type="datetimeFigureOut">
               <a:rPr lang="en-US" smtClean="0"/>
-              <a:t>5/13/2025</a:t>
+              <a:t>6/11/2025</a:t>
             </a:fld>
             <a:endParaRPr lang="en-US"/>
           </a:p>
@@ -1404,7 +1404,7 @@
           <a:p>
             <a:fld id="{D373245B-AA3F-41B9-BB91-29FEC5856266}" type="datetimeFigureOut">
               <a:rPr lang="en-US" smtClean="0"/>
-              <a:t>5/13/2025</a:t>
+              <a:t>6/11/2025</a:t>
             </a:fld>
             <a:endParaRPr lang="en-US"/>
           </a:p>
@@ -1816,7 +1816,7 @@
           <a:p>
             <a:fld id="{D373245B-AA3F-41B9-BB91-29FEC5856266}" type="datetimeFigureOut">
               <a:rPr lang="en-US" smtClean="0"/>
-              <a:t>5/13/2025</a:t>
+              <a:t>6/11/2025</a:t>
             </a:fld>
             <a:endParaRPr lang="en-US"/>
           </a:p>
@@ -1957,7 +1957,7 @@
           <a:p>
             <a:fld id="{D373245B-AA3F-41B9-BB91-29FEC5856266}" type="datetimeFigureOut">
               <a:rPr lang="en-US" smtClean="0"/>
-              <a:t>5/13/2025</a:t>
+              <a:t>6/11/2025</a:t>
             </a:fld>
             <a:endParaRPr lang="en-US"/>
           </a:p>
@@ -2070,7 +2070,7 @@
           <a:p>
             <a:fld id="{D373245B-AA3F-41B9-BB91-29FEC5856266}" type="datetimeFigureOut">
               <a:rPr lang="en-US" smtClean="0"/>
-              <a:t>5/13/2025</a:t>
+              <a:t>6/11/2025</a:t>
             </a:fld>
             <a:endParaRPr lang="en-US"/>
           </a:p>
@@ -2381,7 +2381,7 @@
           <a:p>
             <a:fld id="{D373245B-AA3F-41B9-BB91-29FEC5856266}" type="datetimeFigureOut">
               <a:rPr lang="en-US" smtClean="0"/>
-              <a:t>5/13/2025</a:t>
+              <a:t>6/11/2025</a:t>
             </a:fld>
             <a:endParaRPr lang="en-US"/>
           </a:p>
@@ -2669,7 +2669,7 @@
           <a:p>
             <a:fld id="{D373245B-AA3F-41B9-BB91-29FEC5856266}" type="datetimeFigureOut">
               <a:rPr lang="en-US" smtClean="0"/>
-              <a:t>5/13/2025</a:t>
+              <a:t>6/11/2025</a:t>
             </a:fld>
             <a:endParaRPr lang="en-US"/>
           </a:p>
@@ -2910,7 +2910,7 @@
           <a:p>
             <a:fld id="{D373245B-AA3F-41B9-BB91-29FEC5856266}" type="datetimeFigureOut">
               <a:rPr lang="en-US" smtClean="0"/>
-              <a:t>5/13/2025</a:t>
+              <a:t>6/11/2025</a:t>
             </a:fld>
             <a:endParaRPr lang="en-US"/>
           </a:p>

</xml_diff>